<commit_message>
work in progress - surface projection
</commit_message>
<xml_diff>
--- a/docs/CANlab_Code_Maps_Samples.pptx
+++ b/docs/CANlab_Code_Maps_Samples.pptx
@@ -3892,8 +3892,8 @@
         </p:nvSpPr>
         <p:spPr>
           <a:xfrm>
-            <a:off x="99933" y="163313"/>
-            <a:ext cx="2762538" cy="2462213"/>
+            <a:off x="219202" y="332278"/>
+            <a:ext cx="2762538" cy="2862322"/>
           </a:xfrm>
           <a:prstGeom prst="rect">
             <a:avLst/>
@@ -3907,11 +3907,11 @@
           <a:lstStyle/>
           <a:p>
             <a:r>
-              <a:rPr lang="en-US" sz="1400" b="1" dirty="0"/>
+              <a:rPr lang="en-US" sz="1200" b="1" dirty="0"/>
               <a:t>Use</a:t>
             </a:r>
             <a:r>
-              <a:rPr lang="en-US" sz="1400" dirty="0"/>
+              <a:rPr lang="en-US" sz="1200" dirty="0"/>
               <a:t>:</a:t>
             </a:r>
           </a:p>
@@ -3921,7 +3921,7 @@
               <a:buChar char="•"/>
             </a:pPr>
             <a:r>
-              <a:rPr lang="en-US" sz="1400" dirty="0"/>
+              <a:rPr lang="en-US" sz="1200" dirty="0"/>
               <a:t>Optional inputs control the flow through the system, including keywords that create surfaces</a:t>
             </a:r>
           </a:p>
@@ -3931,7 +3931,7 @@
               <a:buChar char="•"/>
             </a:pPr>
             <a:r>
-              <a:rPr lang="en-US" sz="1400" dirty="0"/>
+              <a:rPr lang="en-US" sz="1200" dirty="0"/>
               <a:t>Many options are passed through to lower-level functions</a:t>
             </a:r>
           </a:p>
@@ -3941,25 +3941,109 @@
               <a:buChar char="•"/>
             </a:pPr>
             <a:r>
-              <a:rPr lang="en-US" sz="1400" dirty="0"/>
+              <a:rPr lang="en-US" sz="1200" dirty="0"/>
               <a:t>Graphics objects in </a:t>
             </a:r>
             <a:r>
-              <a:rPr lang="en-US" sz="1400" dirty="0" err="1"/>
+              <a:rPr lang="en-US" sz="1200" dirty="0" err="1"/>
               <a:t>Matlab</a:t>
             </a:r>
             <a:r>
-              <a:rPr lang="en-US" sz="1400" dirty="0"/>
+              <a:rPr lang="en-US" sz="1200" dirty="0"/>
               <a:t> return </a:t>
             </a:r>
             <a:r>
-              <a:rPr lang="en-US" sz="1400" u="sng" dirty="0"/>
+              <a:rPr lang="en-US" sz="1200" u="sng" dirty="0"/>
               <a:t>handles</a:t>
             </a:r>
             <a:r>
-              <a:rPr lang="en-US" sz="1400" dirty="0"/>
+              <a:rPr lang="en-US" sz="1200" dirty="0"/>
               <a:t> that can be used to manipulate objects</a:t>
             </a:r>
+          </a:p>
+          <a:p>
+            <a:pPr marL="285750" indent="-285750">
+              <a:buFont typeface="Arial" panose="020B0604020202020204" pitchFamily="34" charset="0"/>
+              <a:buChar char="•"/>
+            </a:pPr>
+            <a:r>
+              <a:rPr lang="en-US" sz="1200" dirty="0"/>
+              <a:t>Call object methods by passing in an object. E.g., for </a:t>
+            </a:r>
+            <a:r>
+              <a:rPr lang="en-US" sz="1200" dirty="0" err="1">
+                <a:latin typeface="Calibri" panose="020F0502020204030204" pitchFamily="34" charset="0"/>
+                <a:cs typeface="Calibri" panose="020F0502020204030204" pitchFamily="34" charset="0"/>
+              </a:rPr>
+              <a:t>Image_vector</a:t>
+            </a:r>
+            <a:r>
+              <a:rPr lang="en-US" sz="1200" dirty="0" err="1">
+                <a:solidFill>
+                  <a:schemeClr val="dk1"/>
+                </a:solidFill>
+                <a:latin typeface="Calibri" panose="020F0502020204030204" pitchFamily="34" charset="0"/>
+                <a:cs typeface="Calibri" panose="020F0502020204030204" pitchFamily="34" charset="0"/>
+              </a:rPr>
+              <a:t>.surface</a:t>
+            </a:r>
+            <a:r>
+              <a:rPr lang="en-US" sz="1200" dirty="0">
+                <a:solidFill>
+                  <a:schemeClr val="dk1"/>
+                </a:solidFill>
+                <a:latin typeface="Calibri" panose="020F0502020204030204" pitchFamily="34" charset="0"/>
+                <a:cs typeface="Calibri" panose="020F0502020204030204" pitchFamily="34" charset="0"/>
+              </a:rPr>
+              <a:t>, pass in an </a:t>
+            </a:r>
+            <a:r>
+              <a:rPr lang="en-US" sz="1200" dirty="0" err="1">
+                <a:solidFill>
+                  <a:schemeClr val="dk1"/>
+                </a:solidFill>
+                <a:latin typeface="Calibri" panose="020F0502020204030204" pitchFamily="34" charset="0"/>
+                <a:cs typeface="Calibri" panose="020F0502020204030204" pitchFamily="34" charset="0"/>
+              </a:rPr>
+              <a:t>fmri_data</a:t>
+            </a:r>
+            <a:r>
+              <a:rPr lang="en-US" sz="1200" dirty="0">
+                <a:solidFill>
+                  <a:schemeClr val="dk1"/>
+                </a:solidFill>
+                <a:latin typeface="Calibri" panose="020F0502020204030204" pitchFamily="34" charset="0"/>
+                <a:cs typeface="Calibri" panose="020F0502020204030204" pitchFamily="34" charset="0"/>
+              </a:rPr>
+              <a:t> or other child of the </a:t>
+            </a:r>
+            <a:r>
+              <a:rPr lang="en-US" sz="1200" dirty="0" err="1">
+                <a:solidFill>
+                  <a:schemeClr val="dk1"/>
+                </a:solidFill>
+                <a:latin typeface="Calibri" panose="020F0502020204030204" pitchFamily="34" charset="0"/>
+                <a:cs typeface="Calibri" panose="020F0502020204030204" pitchFamily="34" charset="0"/>
+              </a:rPr>
+              <a:t>image_vector</a:t>
+            </a:r>
+            <a:r>
+              <a:rPr lang="en-US" sz="1200" dirty="0">
+                <a:solidFill>
+                  <a:schemeClr val="dk1"/>
+                </a:solidFill>
+                <a:latin typeface="Calibri" panose="020F0502020204030204" pitchFamily="34" charset="0"/>
+                <a:cs typeface="Calibri" panose="020F0502020204030204" pitchFamily="34" charset="0"/>
+              </a:rPr>
+              <a:t> class</a:t>
+            </a:r>
+          </a:p>
+          <a:p>
+            <a:pPr marL="285750" indent="-285750">
+              <a:buFont typeface="Arial" panose="020B0604020202020204" pitchFamily="34" charset="0"/>
+              <a:buChar char="•"/>
+            </a:pPr>
+            <a:endParaRPr lang="en-US" sz="1200" dirty="0"/>
           </a:p>
         </p:txBody>
       </p:sp>
@@ -7030,6 +7114,79 @@
               <a:latin typeface="Calibri" panose="020F0502020204030204" pitchFamily="34" charset="0"/>
               <a:cs typeface="Calibri" panose="020F0502020204030204" pitchFamily="34" charset="0"/>
             </a:endParaRPr>
+          </a:p>
+        </p:txBody>
+      </p:sp>
+      <p:sp>
+        <p:nvSpPr>
+          <p:cNvPr id="127" name="TextBox 126">
+            <a:extLst>
+              <a:ext uri="{FF2B5EF4-FFF2-40B4-BE49-F238E27FC236}">
+                <a16:creationId xmlns:a16="http://schemas.microsoft.com/office/drawing/2014/main" id="{B01A427C-C121-0FFA-C6D5-CB09A83F5A44}"/>
+              </a:ext>
+            </a:extLst>
+          </p:cNvPr>
+          <p:cNvSpPr txBox="1"/>
+          <p:nvPr/>
+        </p:nvSpPr>
+        <p:spPr>
+          <a:xfrm>
+            <a:off x="8478077" y="1004356"/>
+            <a:ext cx="2874893" cy="1569660"/>
+          </a:xfrm>
+          <a:prstGeom prst="rect">
+            <a:avLst/>
+          </a:prstGeom>
+          <a:noFill/>
+        </p:spPr>
+        <p:txBody>
+          <a:bodyPr wrap="square">
+            <a:spAutoFit/>
+          </a:bodyPr>
+          <a:lstStyle/>
+          <a:p>
+            <a:r>
+              <a:rPr lang="en-US" sz="1200" b="1" dirty="0"/>
+              <a:t>Use</a:t>
+            </a:r>
+            <a:r>
+              <a:rPr lang="en-US" sz="1200" dirty="0"/>
+              <a:t>:</a:t>
+            </a:r>
+          </a:p>
+          <a:p>
+            <a:pPr marL="285750" indent="-285750">
+              <a:buFont typeface="Arial" panose="020B0604020202020204" pitchFamily="34" charset="0"/>
+              <a:buChar char="•"/>
+            </a:pPr>
+            <a:r>
+              <a:rPr lang="en-US" sz="1200" dirty="0"/>
+              <a:t>Use </a:t>
+            </a:r>
+            <a:r>
+              <a:rPr lang="en-US" sz="1200" dirty="0" err="1"/>
+              <a:t>canlab_results_fmridisplay</a:t>
+            </a:r>
+            <a:r>
+              <a:rPr lang="en-US" sz="1200" dirty="0"/>
+              <a:t> to create a ”scene” with multiple surfaces/montages. The </a:t>
+            </a:r>
+            <a:r>
+              <a:rPr lang="en-US" sz="1200" dirty="0" err="1"/>
+              <a:t>fmridisplay</a:t>
+            </a:r>
+            <a:r>
+              <a:rPr lang="en-US" sz="1200" dirty="0"/>
+              <a:t> object (e.g., “o2” in code help”) contains handles to surfaces that can be passed to other functions, e.g., </a:t>
+            </a:r>
+            <a:r>
+              <a:rPr lang="en-US" sz="1200" dirty="0" err="1"/>
+              <a:t>addblobs</a:t>
+            </a:r>
+            <a:r>
+              <a:rPr lang="en-US" sz="1200" dirty="0"/>
+              <a:t>( ) or surface( ).</a:t>
+            </a:r>
           </a:p>
         </p:txBody>
       </p:sp>

</xml_diff>